<commit_message>
Updated flyer and design doc.
</commit_message>
<xml_diff>
--- a/documents/Game Flyer.pptx
+++ b/documents/Game Flyer.pptx
@@ -3283,21 +3283,35 @@
                 <a:latin typeface="Mongolian Baiti" panose="03000500000000000000" pitchFamily="66" charset="0"/>
                 <a:cs typeface="Mongolian Baiti" panose="03000500000000000000" pitchFamily="66" charset="0"/>
               </a:rPr>
-              <a:t>But, no, Faye’s determined not to scolded this time.  She’ll be “responsible” and protect her cat by herself.  She decides to chase after </a:t>
+              <a:t>But, no, Faye’s </a:t>
             </a:r>
             <a:r>
               <a:rPr lang="en-US" dirty="0" smtClean="0">
                 <a:latin typeface="Mongolian Baiti" panose="03000500000000000000" pitchFamily="66" charset="0"/>
                 <a:cs typeface="Mongolian Baiti" panose="03000500000000000000" pitchFamily="66" charset="0"/>
               </a:rPr>
-              <a:t>him.  </a:t>
+              <a:t>determined </a:t>
             </a:r>
             <a:r>
               <a:rPr lang="en-US" smtClean="0">
                 <a:latin typeface="Mongolian Baiti" panose="03000500000000000000" pitchFamily="66" charset="0"/>
                 <a:cs typeface="Mongolian Baiti" panose="03000500000000000000" pitchFamily="66" charset="0"/>
               </a:rPr>
-              <a:t>On </a:t>
+              <a:t>to not be </a:t>
+            </a:r>
+            <a:r>
+              <a:rPr lang="en-US" dirty="0">
+                <a:latin typeface="Mongolian Baiti" panose="03000500000000000000" pitchFamily="66" charset="0"/>
+                <a:cs typeface="Mongolian Baiti" panose="03000500000000000000" pitchFamily="66" charset="0"/>
+              </a:rPr>
+              <a:t>scolded this time.  She’ll be “responsible” and protect her cat by herself.  She decides to chase after </a:t>
+            </a:r>
+            <a:r>
+              <a:rPr lang="en-US" dirty="0" smtClean="0">
+                <a:latin typeface="Mongolian Baiti" panose="03000500000000000000" pitchFamily="66" charset="0"/>
+                <a:cs typeface="Mongolian Baiti" panose="03000500000000000000" pitchFamily="66" charset="0"/>
+              </a:rPr>
+              <a:t>him.  On </a:t>
             </a:r>
             <a:r>
               <a:rPr lang="en-US" dirty="0">

</xml_diff>